<commit_message>
added system architecture diagram
</commit_message>
<xml_diff>
--- a/docs/PinDiagramFlowChart.pptx
+++ b/docs/PinDiagramFlowChart.pptx
@@ -7,6 +7,7 @@
   <p:sldIdLst>
     <p:sldId id="260" r:id="rId2"/>
     <p:sldId id="256" r:id="rId3"/>
+    <p:sldId id="261" r:id="rId4"/>
   </p:sldIdLst>
   <p:sldSz cx="12192000" cy="6858000"/>
   <p:notesSz cx="6858000" cy="9144000"/>
@@ -260,7 +261,7 @@
           <a:p>
             <a:fld id="{43859641-87B3-4D4C-932C-222F1A0ADC66}" type="datetimeFigureOut">
               <a:rPr lang="en-US" smtClean="0"/>
-              <a:t>2/12/2025</a:t>
+              <a:t>2/13/2025</a:t>
             </a:fld>
             <a:endParaRPr lang="en-US"/>
           </a:p>
@@ -458,7 +459,7 @@
           <a:p>
             <a:fld id="{43859641-87B3-4D4C-932C-222F1A0ADC66}" type="datetimeFigureOut">
               <a:rPr lang="en-US" smtClean="0"/>
-              <a:t>2/12/2025</a:t>
+              <a:t>2/13/2025</a:t>
             </a:fld>
             <a:endParaRPr lang="en-US"/>
           </a:p>
@@ -666,7 +667,7 @@
           <a:p>
             <a:fld id="{43859641-87B3-4D4C-932C-222F1A0ADC66}" type="datetimeFigureOut">
               <a:rPr lang="en-US" smtClean="0"/>
-              <a:t>2/12/2025</a:t>
+              <a:t>2/13/2025</a:t>
             </a:fld>
             <a:endParaRPr lang="en-US"/>
           </a:p>
@@ -864,7 +865,7 @@
           <a:p>
             <a:fld id="{43859641-87B3-4D4C-932C-222F1A0ADC66}" type="datetimeFigureOut">
               <a:rPr lang="en-US" smtClean="0"/>
-              <a:t>2/12/2025</a:t>
+              <a:t>2/13/2025</a:t>
             </a:fld>
             <a:endParaRPr lang="en-US"/>
           </a:p>
@@ -1139,7 +1140,7 @@
           <a:p>
             <a:fld id="{43859641-87B3-4D4C-932C-222F1A0ADC66}" type="datetimeFigureOut">
               <a:rPr lang="en-US" smtClean="0"/>
-              <a:t>2/12/2025</a:t>
+              <a:t>2/13/2025</a:t>
             </a:fld>
             <a:endParaRPr lang="en-US"/>
           </a:p>
@@ -1404,7 +1405,7 @@
           <a:p>
             <a:fld id="{43859641-87B3-4D4C-932C-222F1A0ADC66}" type="datetimeFigureOut">
               <a:rPr lang="en-US" smtClean="0"/>
-              <a:t>2/12/2025</a:t>
+              <a:t>2/13/2025</a:t>
             </a:fld>
             <a:endParaRPr lang="en-US"/>
           </a:p>
@@ -1816,7 +1817,7 @@
           <a:p>
             <a:fld id="{43859641-87B3-4D4C-932C-222F1A0ADC66}" type="datetimeFigureOut">
               <a:rPr lang="en-US" smtClean="0"/>
-              <a:t>2/12/2025</a:t>
+              <a:t>2/13/2025</a:t>
             </a:fld>
             <a:endParaRPr lang="en-US"/>
           </a:p>
@@ -1957,7 +1958,7 @@
           <a:p>
             <a:fld id="{43859641-87B3-4D4C-932C-222F1A0ADC66}" type="datetimeFigureOut">
               <a:rPr lang="en-US" smtClean="0"/>
-              <a:t>2/12/2025</a:t>
+              <a:t>2/13/2025</a:t>
             </a:fld>
             <a:endParaRPr lang="en-US"/>
           </a:p>
@@ -2070,7 +2071,7 @@
           <a:p>
             <a:fld id="{43859641-87B3-4D4C-932C-222F1A0ADC66}" type="datetimeFigureOut">
               <a:rPr lang="en-US" smtClean="0"/>
-              <a:t>2/12/2025</a:t>
+              <a:t>2/13/2025</a:t>
             </a:fld>
             <a:endParaRPr lang="en-US"/>
           </a:p>
@@ -2381,7 +2382,7 @@
           <a:p>
             <a:fld id="{43859641-87B3-4D4C-932C-222F1A0ADC66}" type="datetimeFigureOut">
               <a:rPr lang="en-US" smtClean="0"/>
-              <a:t>2/12/2025</a:t>
+              <a:t>2/13/2025</a:t>
             </a:fld>
             <a:endParaRPr lang="en-US"/>
           </a:p>
@@ -2669,7 +2670,7 @@
           <a:p>
             <a:fld id="{43859641-87B3-4D4C-932C-222F1A0ADC66}" type="datetimeFigureOut">
               <a:rPr lang="en-US" smtClean="0"/>
-              <a:t>2/12/2025</a:t>
+              <a:t>2/13/2025</a:t>
             </a:fld>
             <a:endParaRPr lang="en-US"/>
           </a:p>
@@ -2910,7 +2911,7 @@
           <a:p>
             <a:fld id="{43859641-87B3-4D4C-932C-222F1A0ADC66}" type="datetimeFigureOut">
               <a:rPr lang="en-US" smtClean="0"/>
-              <a:t>2/12/2025</a:t>
+              <a:t>2/13/2025</a:t>
             </a:fld>
             <a:endParaRPr lang="en-US"/>
           </a:p>
@@ -7877,6 +7878,689 @@
 </p:sld>
 </file>
 
+<file path=ppt/slides/slide3.xml><?xml version="1.0" encoding="utf-8"?>
+<p:sld xmlns:a="http://schemas.openxmlformats.org/drawingml/2006/main" xmlns:r="http://schemas.openxmlformats.org/officeDocument/2006/relationships" xmlns:p="http://schemas.openxmlformats.org/presentationml/2006/main">
+  <p:cSld>
+    <p:spTree>
+      <p:nvGrpSpPr>
+        <p:cNvPr id="1" name="">
+          <a:extLst>
+            <a:ext uri="{FF2B5EF4-FFF2-40B4-BE49-F238E27FC236}">
+              <a16:creationId xmlns:a16="http://schemas.microsoft.com/office/drawing/2014/main" id="{E2E76EC9-0416-4049-B2AD-D7D236532660}"/>
+            </a:ext>
+          </a:extLst>
+        </p:cNvPr>
+        <p:cNvGrpSpPr/>
+        <p:nvPr/>
+      </p:nvGrpSpPr>
+      <p:grpSpPr>
+        <a:xfrm>
+          <a:off x="0" y="0"/>
+          <a:ext cx="0" cy="0"/>
+          <a:chOff x="0" y="0"/>
+          <a:chExt cx="0" cy="0"/>
+        </a:xfrm>
+      </p:grpSpPr>
+      <p:sp>
+        <p:nvSpPr>
+          <p:cNvPr id="87" name="TextBox 86">
+            <a:extLst>
+              <a:ext uri="{FF2B5EF4-FFF2-40B4-BE49-F238E27FC236}">
+                <a16:creationId xmlns:a16="http://schemas.microsoft.com/office/drawing/2014/main" id="{52405AE5-FD7A-7B28-4F85-49BBC0A573E0}"/>
+              </a:ext>
+            </a:extLst>
+          </p:cNvPr>
+          <p:cNvSpPr txBox="1"/>
+          <p:nvPr/>
+        </p:nvSpPr>
+        <p:spPr>
+          <a:xfrm>
+            <a:off x="1685016" y="241955"/>
+            <a:ext cx="8821967" cy="707886"/>
+          </a:xfrm>
+          <a:prstGeom prst="rect">
+            <a:avLst/>
+          </a:prstGeom>
+          <a:noFill/>
+        </p:spPr>
+        <p:txBody>
+          <a:bodyPr wrap="none" rtlCol="0">
+            <a:spAutoFit/>
+          </a:bodyPr>
+          <a:lstStyle/>
+          <a:p>
+            <a:r>
+              <a:rPr lang="en-US" sz="4000" dirty="0"/>
+              <a:t>Project 3 System Architecture Diagram</a:t>
+            </a:r>
+          </a:p>
+        </p:txBody>
+      </p:sp>
+      <p:grpSp>
+        <p:nvGrpSpPr>
+          <p:cNvPr id="9" name="Group 8">
+            <a:extLst>
+              <a:ext uri="{FF2B5EF4-FFF2-40B4-BE49-F238E27FC236}">
+                <a16:creationId xmlns:a16="http://schemas.microsoft.com/office/drawing/2014/main" id="{10C59B07-DDAB-640E-D8AE-401813D7DD14}"/>
+              </a:ext>
+            </a:extLst>
+          </p:cNvPr>
+          <p:cNvGrpSpPr/>
+          <p:nvPr/>
+        </p:nvGrpSpPr>
+        <p:grpSpPr>
+          <a:xfrm>
+            <a:off x="1151949" y="1413321"/>
+            <a:ext cx="9854357" cy="579178"/>
+            <a:chOff x="3136404" y="1885349"/>
+            <a:chExt cx="5236632" cy="307777"/>
+          </a:xfrm>
+        </p:grpSpPr>
+        <p:sp>
+          <p:nvSpPr>
+            <p:cNvPr id="2" name="Rectangle 1">
+              <a:extLst>
+                <a:ext uri="{FF2B5EF4-FFF2-40B4-BE49-F238E27FC236}">
+                  <a16:creationId xmlns:a16="http://schemas.microsoft.com/office/drawing/2014/main" id="{8F966CFE-2922-943F-4F63-EC7850817A32}"/>
+                </a:ext>
+              </a:extLst>
+            </p:cNvPr>
+            <p:cNvSpPr/>
+            <p:nvPr/>
+          </p:nvSpPr>
+          <p:spPr>
+            <a:xfrm>
+              <a:off x="3136404" y="1885349"/>
+              <a:ext cx="1435597" cy="307777"/>
+            </a:xfrm>
+            <a:prstGeom prst="rect">
+              <a:avLst/>
+            </a:prstGeom>
+            <a:solidFill>
+              <a:schemeClr val="tx2">
+                <a:lumMod val="50000"/>
+                <a:lumOff val="50000"/>
+              </a:schemeClr>
+            </a:solidFill>
+          </p:spPr>
+          <p:style>
+            <a:lnRef idx="2">
+              <a:schemeClr val="accent1">
+                <a:shade val="15000"/>
+              </a:schemeClr>
+            </a:lnRef>
+            <a:fillRef idx="1">
+              <a:schemeClr val="accent1"/>
+            </a:fillRef>
+            <a:effectRef idx="0">
+              <a:schemeClr val="accent1"/>
+            </a:effectRef>
+            <a:fontRef idx="minor">
+              <a:schemeClr val="lt1"/>
+            </a:fontRef>
+          </p:style>
+          <p:txBody>
+            <a:bodyPr wrap="square" lIns="91440" tIns="45720" rIns="91440" bIns="45720" rtlCol="0" anchor="ctr">
+              <a:spAutoFit/>
+            </a:bodyPr>
+            <a:lstStyle/>
+            <a:p>
+              <a:pPr algn="ctr"/>
+              <a:r>
+                <a:rPr lang="en-US" sz="1400" dirty="0"/>
+                <a:t>RGB LED</a:t>
+              </a:r>
+            </a:p>
+          </p:txBody>
+        </p:sp>
+        <p:sp>
+          <p:nvSpPr>
+            <p:cNvPr id="3" name="Rectangle 2">
+              <a:extLst>
+                <a:ext uri="{FF2B5EF4-FFF2-40B4-BE49-F238E27FC236}">
+                  <a16:creationId xmlns:a16="http://schemas.microsoft.com/office/drawing/2014/main" id="{25CDBD50-1FCE-7A68-40A4-0080C6AB5684}"/>
+                </a:ext>
+              </a:extLst>
+            </p:cNvPr>
+            <p:cNvSpPr/>
+            <p:nvPr/>
+          </p:nvSpPr>
+          <p:spPr>
+            <a:xfrm>
+              <a:off x="5036921" y="1885349"/>
+              <a:ext cx="1435597" cy="307777"/>
+            </a:xfrm>
+            <a:prstGeom prst="rect">
+              <a:avLst/>
+            </a:prstGeom>
+            <a:solidFill>
+              <a:schemeClr val="tx2">
+                <a:lumMod val="50000"/>
+                <a:lumOff val="50000"/>
+              </a:schemeClr>
+            </a:solidFill>
+          </p:spPr>
+          <p:style>
+            <a:lnRef idx="2">
+              <a:schemeClr val="accent1">
+                <a:shade val="15000"/>
+              </a:schemeClr>
+            </a:lnRef>
+            <a:fillRef idx="1">
+              <a:schemeClr val="accent1"/>
+            </a:fillRef>
+            <a:effectRef idx="0">
+              <a:schemeClr val="accent1"/>
+            </a:effectRef>
+            <a:fontRef idx="minor">
+              <a:schemeClr val="lt1"/>
+            </a:fontRef>
+          </p:style>
+          <p:txBody>
+            <a:bodyPr wrap="square" lIns="91440" tIns="45720" rIns="91440" bIns="45720" rtlCol="0" anchor="ctr">
+              <a:spAutoFit/>
+            </a:bodyPr>
+            <a:lstStyle/>
+            <a:p>
+              <a:pPr algn="ctr"/>
+              <a:r>
+                <a:rPr lang="en-US" sz="1400" dirty="0"/>
+                <a:t>KEYPAD</a:t>
+              </a:r>
+            </a:p>
+          </p:txBody>
+        </p:sp>
+        <p:sp>
+          <p:nvSpPr>
+            <p:cNvPr id="7" name="Rectangle 6">
+              <a:extLst>
+                <a:ext uri="{FF2B5EF4-FFF2-40B4-BE49-F238E27FC236}">
+                  <a16:creationId xmlns:a16="http://schemas.microsoft.com/office/drawing/2014/main" id="{F142AC58-47CB-71F7-04FE-67ED7B3A41B7}"/>
+                </a:ext>
+              </a:extLst>
+            </p:cNvPr>
+            <p:cNvSpPr/>
+            <p:nvPr/>
+          </p:nvSpPr>
+          <p:spPr>
+            <a:xfrm>
+              <a:off x="6937439" y="1885349"/>
+              <a:ext cx="1435597" cy="307777"/>
+            </a:xfrm>
+            <a:prstGeom prst="rect">
+              <a:avLst/>
+            </a:prstGeom>
+            <a:solidFill>
+              <a:schemeClr val="tx2">
+                <a:lumMod val="50000"/>
+                <a:lumOff val="50000"/>
+              </a:schemeClr>
+            </a:solidFill>
+          </p:spPr>
+          <p:style>
+            <a:lnRef idx="2">
+              <a:schemeClr val="accent1">
+                <a:shade val="15000"/>
+              </a:schemeClr>
+            </a:lnRef>
+            <a:fillRef idx="1">
+              <a:schemeClr val="accent1"/>
+            </a:fillRef>
+            <a:effectRef idx="0">
+              <a:schemeClr val="accent1"/>
+            </a:effectRef>
+            <a:fontRef idx="minor">
+              <a:schemeClr val="lt1"/>
+            </a:fontRef>
+          </p:style>
+          <p:txBody>
+            <a:bodyPr wrap="square" lIns="91440" tIns="45720" rIns="91440" bIns="45720" rtlCol="0" anchor="ctr">
+              <a:spAutoFit/>
+            </a:bodyPr>
+            <a:lstStyle/>
+            <a:p>
+              <a:pPr algn="ctr"/>
+              <a:r>
+                <a:rPr lang="en-US" sz="1400" dirty="0"/>
+                <a:t>LED ARRAY</a:t>
+              </a:r>
+            </a:p>
+          </p:txBody>
+        </p:sp>
+      </p:grpSp>
+      <p:sp>
+        <p:nvSpPr>
+          <p:cNvPr id="11" name="Rectangle 10">
+            <a:extLst>
+              <a:ext uri="{FF2B5EF4-FFF2-40B4-BE49-F238E27FC236}">
+                <a16:creationId xmlns:a16="http://schemas.microsoft.com/office/drawing/2014/main" id="{3BD41673-5423-CC89-5612-F303F9D9E6E1}"/>
+              </a:ext>
+            </a:extLst>
+          </p:cNvPr>
+          <p:cNvSpPr/>
+          <p:nvPr/>
+        </p:nvSpPr>
+        <p:spPr>
+          <a:xfrm>
+            <a:off x="1151946" y="4865500"/>
+            <a:ext cx="2701524" cy="579178"/>
+          </a:xfrm>
+          <a:prstGeom prst="rect">
+            <a:avLst/>
+          </a:prstGeom>
+          <a:solidFill>
+            <a:schemeClr val="tx2">
+              <a:lumMod val="50000"/>
+              <a:lumOff val="50000"/>
+            </a:schemeClr>
+          </a:solidFill>
+        </p:spPr>
+        <p:style>
+          <a:lnRef idx="2">
+            <a:schemeClr val="accent1">
+              <a:shade val="15000"/>
+            </a:schemeClr>
+          </a:lnRef>
+          <a:fillRef idx="1">
+            <a:schemeClr val="accent1"/>
+          </a:fillRef>
+          <a:effectRef idx="0">
+            <a:schemeClr val="accent1"/>
+          </a:effectRef>
+          <a:fontRef idx="minor">
+            <a:schemeClr val="lt1"/>
+          </a:fontRef>
+        </p:style>
+        <p:txBody>
+          <a:bodyPr wrap="square" lIns="91440" tIns="45720" rIns="91440" bIns="45720" rtlCol="0" anchor="ctr">
+            <a:spAutoFit/>
+          </a:bodyPr>
+          <a:lstStyle/>
+          <a:p>
+            <a:pPr algn="ctr"/>
+            <a:r>
+              <a:rPr lang="en-US" sz="1400" dirty="0"/>
+              <a:t>TIMER</a:t>
+            </a:r>
+          </a:p>
+        </p:txBody>
+      </p:sp>
+      <p:sp>
+        <p:nvSpPr>
+          <p:cNvPr id="12" name="Rectangle 11">
+            <a:extLst>
+              <a:ext uri="{FF2B5EF4-FFF2-40B4-BE49-F238E27FC236}">
+                <a16:creationId xmlns:a16="http://schemas.microsoft.com/office/drawing/2014/main" id="{96C05FE3-07CD-004C-8DFD-B16951288276}"/>
+              </a:ext>
+            </a:extLst>
+          </p:cNvPr>
+          <p:cNvSpPr/>
+          <p:nvPr/>
+        </p:nvSpPr>
+        <p:spPr>
+          <a:xfrm>
+            <a:off x="1151946" y="2936699"/>
+            <a:ext cx="2701524" cy="984602"/>
+          </a:xfrm>
+          <a:prstGeom prst="rect">
+            <a:avLst/>
+          </a:prstGeom>
+          <a:solidFill>
+            <a:schemeClr val="tx2">
+              <a:lumMod val="50000"/>
+              <a:lumOff val="50000"/>
+            </a:schemeClr>
+          </a:solidFill>
+        </p:spPr>
+        <p:style>
+          <a:lnRef idx="2">
+            <a:schemeClr val="accent1">
+              <a:shade val="15000"/>
+            </a:schemeClr>
+          </a:lnRef>
+          <a:fillRef idx="1">
+            <a:schemeClr val="accent1"/>
+          </a:fillRef>
+          <a:effectRef idx="0">
+            <a:schemeClr val="accent1"/>
+          </a:effectRef>
+          <a:fontRef idx="minor">
+            <a:schemeClr val="lt1"/>
+          </a:fontRef>
+        </p:style>
+        <p:txBody>
+          <a:bodyPr wrap="square" lIns="91440" tIns="45720" rIns="91440" bIns="45720" rtlCol="0" anchor="ctr">
+            <a:spAutoFit/>
+          </a:bodyPr>
+          <a:lstStyle/>
+          <a:p>
+            <a:pPr algn="ctr"/>
+            <a:r>
+              <a:rPr lang="en-US" sz="1400" dirty="0"/>
+              <a:t>PWM CONTROLLER</a:t>
+            </a:r>
+          </a:p>
+        </p:txBody>
+      </p:sp>
+      <p:sp>
+        <p:nvSpPr>
+          <p:cNvPr id="15" name="Rectangle 14">
+            <a:extLst>
+              <a:ext uri="{FF2B5EF4-FFF2-40B4-BE49-F238E27FC236}">
+                <a16:creationId xmlns:a16="http://schemas.microsoft.com/office/drawing/2014/main" id="{1DC037ED-EDBF-5CB0-9742-5F290768E607}"/>
+              </a:ext>
+            </a:extLst>
+          </p:cNvPr>
+          <p:cNvSpPr/>
+          <p:nvPr/>
+        </p:nvSpPr>
+        <p:spPr>
+          <a:xfrm>
+            <a:off x="4728363" y="4865498"/>
+            <a:ext cx="2701524" cy="579178"/>
+          </a:xfrm>
+          <a:prstGeom prst="rect">
+            <a:avLst/>
+          </a:prstGeom>
+          <a:solidFill>
+            <a:schemeClr val="tx2">
+              <a:lumMod val="50000"/>
+              <a:lumOff val="50000"/>
+            </a:schemeClr>
+          </a:solidFill>
+        </p:spPr>
+        <p:style>
+          <a:lnRef idx="2">
+            <a:schemeClr val="accent1">
+              <a:shade val="15000"/>
+            </a:schemeClr>
+          </a:lnRef>
+          <a:fillRef idx="1">
+            <a:schemeClr val="accent1"/>
+          </a:fillRef>
+          <a:effectRef idx="0">
+            <a:schemeClr val="accent1"/>
+          </a:effectRef>
+          <a:fontRef idx="minor">
+            <a:schemeClr val="lt1"/>
+          </a:fontRef>
+        </p:style>
+        <p:txBody>
+          <a:bodyPr wrap="square" lIns="91440" tIns="45720" rIns="91440" bIns="45720" rtlCol="0" anchor="ctr">
+            <a:spAutoFit/>
+          </a:bodyPr>
+          <a:lstStyle/>
+          <a:p>
+            <a:pPr algn="ctr"/>
+            <a:r>
+              <a:rPr lang="en-US" sz="1400" dirty="0"/>
+              <a:t>GPIO</a:t>
+            </a:r>
+          </a:p>
+        </p:txBody>
+      </p:sp>
+      <p:cxnSp>
+        <p:nvCxnSpPr>
+          <p:cNvPr id="23" name="Straight Arrow Connector 22">
+            <a:extLst>
+              <a:ext uri="{FF2B5EF4-FFF2-40B4-BE49-F238E27FC236}">
+                <a16:creationId xmlns:a16="http://schemas.microsoft.com/office/drawing/2014/main" id="{370B5F64-DE3B-4FC2-9EB7-7CE07550AAEF}"/>
+              </a:ext>
+            </a:extLst>
+          </p:cNvPr>
+          <p:cNvCxnSpPr>
+            <a:stCxn id="11" idx="0"/>
+            <a:endCxn id="12" idx="2"/>
+          </p:cNvCxnSpPr>
+          <p:nvPr/>
+        </p:nvCxnSpPr>
+        <p:spPr>
+          <a:xfrm flipV="1">
+            <a:off x="2502708" y="3921300"/>
+            <a:ext cx="0" cy="944199"/>
+          </a:xfrm>
+          <a:prstGeom prst="straightConnector1">
+            <a:avLst/>
+          </a:prstGeom>
+          <a:ln>
+            <a:tailEnd type="triangle"/>
+          </a:ln>
+        </p:spPr>
+        <p:style>
+          <a:lnRef idx="2">
+            <a:schemeClr val="accent1"/>
+          </a:lnRef>
+          <a:fillRef idx="0">
+            <a:schemeClr val="accent1"/>
+          </a:fillRef>
+          <a:effectRef idx="1">
+            <a:schemeClr val="accent1"/>
+          </a:effectRef>
+          <a:fontRef idx="minor">
+            <a:schemeClr val="tx1"/>
+          </a:fontRef>
+        </p:style>
+      </p:cxnSp>
+      <p:cxnSp>
+        <p:nvCxnSpPr>
+          <p:cNvPr id="30" name="Straight Arrow Connector 29">
+            <a:extLst>
+              <a:ext uri="{FF2B5EF4-FFF2-40B4-BE49-F238E27FC236}">
+                <a16:creationId xmlns:a16="http://schemas.microsoft.com/office/drawing/2014/main" id="{4CC49DD1-F2DD-E574-E4DB-EB891EF829E3}"/>
+              </a:ext>
+            </a:extLst>
+          </p:cNvPr>
+          <p:cNvCxnSpPr>
+            <a:cxnSpLocks/>
+            <a:stCxn id="12" idx="0"/>
+            <a:endCxn id="2" idx="2"/>
+          </p:cNvCxnSpPr>
+          <p:nvPr/>
+        </p:nvCxnSpPr>
+        <p:spPr>
+          <a:xfrm flipV="1">
+            <a:off x="2502708" y="1992499"/>
+            <a:ext cx="4" cy="944199"/>
+          </a:xfrm>
+          <a:prstGeom prst="straightConnector1">
+            <a:avLst/>
+          </a:prstGeom>
+          <a:ln>
+            <a:tailEnd type="triangle"/>
+          </a:ln>
+        </p:spPr>
+        <p:style>
+          <a:lnRef idx="2">
+            <a:schemeClr val="accent1"/>
+          </a:lnRef>
+          <a:fillRef idx="0">
+            <a:schemeClr val="accent1"/>
+          </a:fillRef>
+          <a:effectRef idx="1">
+            <a:schemeClr val="accent1"/>
+          </a:effectRef>
+          <a:fontRef idx="minor">
+            <a:schemeClr val="tx1"/>
+          </a:fontRef>
+        </p:style>
+      </p:cxnSp>
+      <p:cxnSp>
+        <p:nvCxnSpPr>
+          <p:cNvPr id="33" name="Straight Arrow Connector 32">
+            <a:extLst>
+              <a:ext uri="{FF2B5EF4-FFF2-40B4-BE49-F238E27FC236}">
+                <a16:creationId xmlns:a16="http://schemas.microsoft.com/office/drawing/2014/main" id="{7B4BA71E-761A-BE49-D883-380BACAEB12C}"/>
+              </a:ext>
+            </a:extLst>
+          </p:cNvPr>
+          <p:cNvCxnSpPr>
+            <a:cxnSpLocks/>
+            <a:stCxn id="15" idx="0"/>
+            <a:endCxn id="7" idx="2"/>
+          </p:cNvCxnSpPr>
+          <p:nvPr/>
+        </p:nvCxnSpPr>
+        <p:spPr>
+          <a:xfrm flipV="1">
+            <a:off x="6079126" y="1992499"/>
+            <a:ext cx="3576420" cy="2872998"/>
+          </a:xfrm>
+          <a:prstGeom prst="straightConnector1">
+            <a:avLst/>
+          </a:prstGeom>
+          <a:ln>
+            <a:tailEnd type="triangle"/>
+          </a:ln>
+        </p:spPr>
+        <p:style>
+          <a:lnRef idx="2">
+            <a:schemeClr val="accent1"/>
+          </a:lnRef>
+          <a:fillRef idx="0">
+            <a:schemeClr val="accent1"/>
+          </a:fillRef>
+          <a:effectRef idx="1">
+            <a:schemeClr val="accent1"/>
+          </a:effectRef>
+          <a:fontRef idx="minor">
+            <a:schemeClr val="tx1"/>
+          </a:fontRef>
+        </p:style>
+      </p:cxnSp>
+      <p:cxnSp>
+        <p:nvCxnSpPr>
+          <p:cNvPr id="36" name="Straight Arrow Connector 35">
+            <a:extLst>
+              <a:ext uri="{FF2B5EF4-FFF2-40B4-BE49-F238E27FC236}">
+                <a16:creationId xmlns:a16="http://schemas.microsoft.com/office/drawing/2014/main" id="{61A30B6A-D90D-992C-D908-F956FB990D71}"/>
+              </a:ext>
+            </a:extLst>
+          </p:cNvPr>
+          <p:cNvCxnSpPr>
+            <a:cxnSpLocks/>
+            <a:stCxn id="15" idx="0"/>
+            <a:endCxn id="3" idx="2"/>
+          </p:cNvCxnSpPr>
+          <p:nvPr/>
+        </p:nvCxnSpPr>
+        <p:spPr>
+          <a:xfrm flipV="1">
+            <a:off x="6079126" y="1992499"/>
+            <a:ext cx="2" cy="2872998"/>
+          </a:xfrm>
+          <a:prstGeom prst="straightConnector1">
+            <a:avLst/>
+          </a:prstGeom>
+          <a:ln>
+            <a:tailEnd type="triangle"/>
+          </a:ln>
+        </p:spPr>
+        <p:style>
+          <a:lnRef idx="2">
+            <a:schemeClr val="accent1"/>
+          </a:lnRef>
+          <a:fillRef idx="0">
+            <a:schemeClr val="accent1"/>
+          </a:fillRef>
+          <a:effectRef idx="1">
+            <a:schemeClr val="accent1"/>
+          </a:effectRef>
+          <a:fontRef idx="minor">
+            <a:schemeClr val="tx1"/>
+          </a:fontRef>
+        </p:style>
+      </p:cxnSp>
+      <p:cxnSp>
+        <p:nvCxnSpPr>
+          <p:cNvPr id="40" name="Straight Connector 39">
+            <a:extLst>
+              <a:ext uri="{FF2B5EF4-FFF2-40B4-BE49-F238E27FC236}">
+                <a16:creationId xmlns:a16="http://schemas.microsoft.com/office/drawing/2014/main" id="{BAE91B9D-2394-7EFD-13A9-5246442B8D90}"/>
+              </a:ext>
+            </a:extLst>
+          </p:cNvPr>
+          <p:cNvCxnSpPr/>
+          <p:nvPr/>
+        </p:nvCxnSpPr>
+        <p:spPr>
+          <a:xfrm>
+            <a:off x="536164" y="2464599"/>
+            <a:ext cx="11119669" cy="0"/>
+          </a:xfrm>
+          <a:prstGeom prst="line">
+            <a:avLst/>
+          </a:prstGeom>
+          <a:ln w="38100">
+            <a:prstDash val="lgDash"/>
+          </a:ln>
+        </p:spPr>
+        <p:style>
+          <a:lnRef idx="2">
+            <a:schemeClr val="accent1"/>
+          </a:lnRef>
+          <a:fillRef idx="0">
+            <a:schemeClr val="accent1"/>
+          </a:fillRef>
+          <a:effectRef idx="1">
+            <a:schemeClr val="accent1"/>
+          </a:effectRef>
+          <a:fontRef idx="minor">
+            <a:schemeClr val="tx1"/>
+          </a:fontRef>
+        </p:style>
+      </p:cxnSp>
+      <p:cxnSp>
+        <p:nvCxnSpPr>
+          <p:cNvPr id="41" name="Straight Connector 40">
+            <a:extLst>
+              <a:ext uri="{FF2B5EF4-FFF2-40B4-BE49-F238E27FC236}">
+                <a16:creationId xmlns:a16="http://schemas.microsoft.com/office/drawing/2014/main" id="{2C707A27-D583-8E3B-0473-EF9438BEE50A}"/>
+              </a:ext>
+            </a:extLst>
+          </p:cNvPr>
+          <p:cNvCxnSpPr/>
+          <p:nvPr/>
+        </p:nvCxnSpPr>
+        <p:spPr>
+          <a:xfrm>
+            <a:off x="536164" y="4334051"/>
+            <a:ext cx="11119669" cy="0"/>
+          </a:xfrm>
+          <a:prstGeom prst="line">
+            <a:avLst/>
+          </a:prstGeom>
+          <a:ln w="38100">
+            <a:prstDash val="lgDash"/>
+          </a:ln>
+        </p:spPr>
+        <p:style>
+          <a:lnRef idx="2">
+            <a:schemeClr val="accent1"/>
+          </a:lnRef>
+          <a:fillRef idx="0">
+            <a:schemeClr val="accent1"/>
+          </a:fillRef>
+          <a:effectRef idx="1">
+            <a:schemeClr val="accent1"/>
+          </a:effectRef>
+          <a:fontRef idx="minor">
+            <a:schemeClr val="tx1"/>
+          </a:fontRef>
+        </p:style>
+      </p:cxnSp>
+    </p:spTree>
+    <p:extLst>
+      <p:ext uri="{BB962C8B-B14F-4D97-AF65-F5344CB8AC3E}">
+        <p14:creationId xmlns:p14="http://schemas.microsoft.com/office/powerpoint/2010/main" val="1742268872"/>
+      </p:ext>
+    </p:extLst>
+  </p:cSld>
+  <p:clrMapOvr>
+    <a:masterClrMapping/>
+  </p:clrMapOvr>
+</p:sld>
+</file>
+
 <file path=ppt/theme/theme1.xml><?xml version="1.0" encoding="utf-8"?>
 <a:theme xmlns:a="http://schemas.openxmlformats.org/drawingml/2006/main" name="Office Theme">
   <a:themeElements>

</xml_diff>